<commit_message>
updaten virtual server setup
</commit_message>
<xml_diff>
--- a/public/cursus/virtual-server-setup.pptx
+++ b/public/cursus/virtual-server-setup.pptx
@@ -37,8 +37,9 @@
     <p:sldId id="287" r:id="rId31"/>
     <p:sldId id="289" r:id="rId32"/>
     <p:sldId id="290" r:id="rId33"/>
-    <p:sldId id="291" r:id="rId34"/>
-    <p:sldId id="292" r:id="rId35"/>
+    <p:sldId id="293" r:id="rId34"/>
+    <p:sldId id="291" r:id="rId35"/>
+    <p:sldId id="292" r:id="rId36"/>
   </p:sldIdLst>
   <p:sldSz cx="9144000" cy="6858000" type="screen4x3"/>
   <p:notesSz cx="6858000" cy="9144000"/>
@@ -321,7 +322,7 @@
           <a:p>
             <a:fld id="{B3EE679E-5AFE-4612-8A3B-94B6C31B730F}" type="datetimeFigureOut">
               <a:rPr lang="nl-BE" smtClean="0"/>
-              <a:t>27/07/2014</a:t>
+              <a:t>5/10/2015</a:t>
             </a:fld>
             <a:endParaRPr lang="nl-BE"/>
           </a:p>
@@ -491,7 +492,7 @@
           <a:p>
             <a:fld id="{B3EE679E-5AFE-4612-8A3B-94B6C31B730F}" type="datetimeFigureOut">
               <a:rPr lang="nl-BE" smtClean="0"/>
-              <a:t>27/07/2014</a:t>
+              <a:t>5/10/2015</a:t>
             </a:fld>
             <a:endParaRPr lang="nl-BE"/>
           </a:p>
@@ -671,7 +672,7 @@
           <a:p>
             <a:fld id="{B3EE679E-5AFE-4612-8A3B-94B6C31B730F}" type="datetimeFigureOut">
               <a:rPr lang="nl-BE" smtClean="0"/>
-              <a:t>27/07/2014</a:t>
+              <a:t>5/10/2015</a:t>
             </a:fld>
             <a:endParaRPr lang="nl-BE"/>
           </a:p>
@@ -841,7 +842,7 @@
           <a:p>
             <a:fld id="{B3EE679E-5AFE-4612-8A3B-94B6C31B730F}" type="datetimeFigureOut">
               <a:rPr lang="nl-BE" smtClean="0"/>
-              <a:t>27/07/2014</a:t>
+              <a:t>5/10/2015</a:t>
             </a:fld>
             <a:endParaRPr lang="nl-BE"/>
           </a:p>
@@ -1087,7 +1088,7 @@
           <a:p>
             <a:fld id="{B3EE679E-5AFE-4612-8A3B-94B6C31B730F}" type="datetimeFigureOut">
               <a:rPr lang="nl-BE" smtClean="0"/>
-              <a:t>27/07/2014</a:t>
+              <a:t>5/10/2015</a:t>
             </a:fld>
             <a:endParaRPr lang="nl-BE"/>
           </a:p>
@@ -1375,7 +1376,7 @@
           <a:p>
             <a:fld id="{B3EE679E-5AFE-4612-8A3B-94B6C31B730F}" type="datetimeFigureOut">
               <a:rPr lang="nl-BE" smtClean="0"/>
-              <a:t>27/07/2014</a:t>
+              <a:t>5/10/2015</a:t>
             </a:fld>
             <a:endParaRPr lang="nl-BE"/>
           </a:p>
@@ -1797,7 +1798,7 @@
           <a:p>
             <a:fld id="{B3EE679E-5AFE-4612-8A3B-94B6C31B730F}" type="datetimeFigureOut">
               <a:rPr lang="nl-BE" smtClean="0"/>
-              <a:t>27/07/2014</a:t>
+              <a:t>5/10/2015</a:t>
             </a:fld>
             <a:endParaRPr lang="nl-BE"/>
           </a:p>
@@ -1915,7 +1916,7 @@
           <a:p>
             <a:fld id="{B3EE679E-5AFE-4612-8A3B-94B6C31B730F}" type="datetimeFigureOut">
               <a:rPr lang="nl-BE" smtClean="0"/>
-              <a:t>27/07/2014</a:t>
+              <a:t>5/10/2015</a:t>
             </a:fld>
             <a:endParaRPr lang="nl-BE"/>
           </a:p>
@@ -2010,7 +2011,7 @@
           <a:p>
             <a:fld id="{B3EE679E-5AFE-4612-8A3B-94B6C31B730F}" type="datetimeFigureOut">
               <a:rPr lang="nl-BE" smtClean="0"/>
-              <a:t>27/07/2014</a:t>
+              <a:t>5/10/2015</a:t>
             </a:fld>
             <a:endParaRPr lang="nl-BE"/>
           </a:p>
@@ -2287,7 +2288,7 @@
           <a:p>
             <a:fld id="{B3EE679E-5AFE-4612-8A3B-94B6C31B730F}" type="datetimeFigureOut">
               <a:rPr lang="nl-BE" smtClean="0"/>
-              <a:t>27/07/2014</a:t>
+              <a:t>5/10/2015</a:t>
             </a:fld>
             <a:endParaRPr lang="nl-BE"/>
           </a:p>
@@ -2540,7 +2541,7 @@
           <a:p>
             <a:fld id="{B3EE679E-5AFE-4612-8A3B-94B6C31B730F}" type="datetimeFigureOut">
               <a:rPr lang="nl-BE" smtClean="0"/>
-              <a:t>27/07/2014</a:t>
+              <a:t>5/10/2015</a:t>
             </a:fld>
             <a:endParaRPr lang="nl-BE"/>
           </a:p>
@@ -2753,7 +2754,7 @@
           <a:p>
             <a:fld id="{B3EE679E-5AFE-4612-8A3B-94B6C31B730F}" type="datetimeFigureOut">
               <a:rPr lang="nl-BE" smtClean="0"/>
-              <a:t>27/07/2014</a:t>
+              <a:t>5/10/2015</a:t>
             </a:fld>
             <a:endParaRPr lang="nl-BE"/>
           </a:p>
@@ -4585,14 +4586,46 @@
         </p:spPr>
         <p:txBody>
           <a:bodyPr>
-            <a:normAutofit fontScale="92500" lnSpcReduction="10000"/>
+            <a:normAutofit fontScale="85000" lnSpcReduction="20000"/>
           </a:bodyPr>
           <a:lstStyle/>
           <a:p>
             <a:pPr lvl="1"/>
             <a:r>
               <a:rPr lang="nl-BE" dirty="0" smtClean="0"/>
-              <a:t>Surfen naar: http://localhost/security</a:t>
+              <a:t>Surfen naar: </a:t>
+            </a:r>
+            <a:r>
+              <a:rPr lang="nl-BE" dirty="0" smtClean="0">
+                <a:hlinkClick r:id="rId2"/>
+              </a:rPr>
+              <a:t>http://</a:t>
+            </a:r>
+            <a:r>
+              <a:rPr lang="nl-BE" dirty="0" smtClean="0">
+                <a:hlinkClick r:id="rId2"/>
+              </a:rPr>
+              <a:t>localhost/security</a:t>
+            </a:r>
+            <a:endParaRPr lang="nl-BE" dirty="0" smtClean="0"/>
+          </a:p>
+          <a:p>
+            <a:pPr lvl="2"/>
+            <a:r>
+              <a:rPr lang="nl-BE" dirty="0" smtClean="0"/>
+              <a:t>(</a:t>
+            </a:r>
+            <a:r>
+              <a:rPr lang="nl-BE" b="1" dirty="0" smtClean="0"/>
+              <a:t>let op</a:t>
+            </a:r>
+            <a:r>
+              <a:rPr lang="nl-BE" dirty="0" smtClean="0"/>
+              <a:t>: deze pagina bestaat mogelijk niet in jouw versie van XAMPP -&gt; manueel op zoek gaan naar security pagina)</a:t>
+            </a:r>
+            <a:r>
+              <a:rPr lang="nl-BE" dirty="0" smtClean="0"/>
+              <a:t/>
             </a:r>
             <a:br>
               <a:rPr lang="nl-BE" dirty="0" smtClean="0"/>
@@ -4652,6 +4685,20 @@
             <a:pPr marL="457200" lvl="1" indent="0">
               <a:buNone/>
             </a:pPr>
+            <a:r>
+              <a:rPr lang="nl-BE" dirty="0" smtClean="0"/>
+              <a:t/>
+            </a:r>
+            <a:br>
+              <a:rPr lang="nl-BE" dirty="0" smtClean="0"/>
+            </a:br>
+            <a:r>
+              <a:rPr lang="nl-BE" dirty="0" smtClean="0"/>
+              <a:t/>
+            </a:r>
+            <a:br>
+              <a:rPr lang="nl-BE" dirty="0" smtClean="0"/>
+            </a:br>
             <a:r>
               <a:rPr lang="nl-BE" dirty="0" smtClean="0"/>
               <a:t/>
@@ -4694,7 +4741,7 @@
           <p:nvPr/>
         </p:nvPicPr>
         <p:blipFill>
-          <a:blip r:embed="rId2">
+          <a:blip r:embed="rId3">
             <a:extLst>
               <a:ext uri="{28A0092B-C50C-407E-A947-70E740481C1C}">
                 <a14:useLocalDpi xmlns:a14="http://schemas.microsoft.com/office/drawing/2010/main" val="0"/>
@@ -4708,7 +4755,7 @@
         </p:blipFill>
         <p:spPr bwMode="auto">
           <a:xfrm>
-            <a:off x="526248" y="2420888"/>
+            <a:off x="559536" y="2564904"/>
             <a:ext cx="8063252" cy="3207816"/>
           </a:xfrm>
           <a:prstGeom prst="rect">
@@ -5390,7 +5437,7 @@
         <p:spPr/>
         <p:txBody>
           <a:bodyPr>
-            <a:normAutofit fontScale="85000" lnSpcReduction="20000"/>
+            <a:normAutofit fontScale="77500" lnSpcReduction="20000"/>
           </a:bodyPr>
           <a:lstStyle/>
           <a:p>
@@ -5461,7 +5508,17 @@
             <a:pPr lvl="1"/>
             <a:r>
               <a:rPr lang="nl-BE" dirty="0" smtClean="0"/>
-              <a:t>configuratie</a:t>
+              <a:t>Configuratie</a:t>
+            </a:r>
+          </a:p>
+          <a:p>
+            <a:r>
+              <a:rPr lang="nl-BE" dirty="0" smtClean="0"/>
+              <a:t>FAQ &amp; </a:t>
+            </a:r>
+            <a:r>
+              <a:rPr lang="nl-BE" dirty="0" err="1" smtClean="0"/>
+              <a:t>troubleshoot</a:t>
             </a:r>
             <a:endParaRPr lang="nl-BE" dirty="0"/>
           </a:p>
@@ -7140,7 +7197,7 @@
         </p:spPr>
         <p:txBody>
           <a:bodyPr>
-            <a:normAutofit/>
+            <a:normAutofit fontScale="92500" lnSpcReduction="10000"/>
           </a:bodyPr>
           <a:lstStyle/>
           <a:p>
@@ -7187,13 +7244,93 @@
               <a:t>	</a:t>
             </a:r>
             <a:r>
+              <a:rPr lang="nl-BE" sz="1400" dirty="0">
+                <a:solidFill>
+                  <a:schemeClr val="tx2"/>
+                </a:solidFill>
+                <a:latin typeface="Lucida Console" panose="020B0609040504020204" pitchFamily="49" charset="0"/>
+              </a:rPr>
+              <a:t>&lt;</a:t>
+            </a:r>
+            <a:r>
+              <a:rPr lang="nl-BE" sz="1400" dirty="0" err="1">
+                <a:solidFill>
+                  <a:schemeClr val="tx2"/>
+                </a:solidFill>
+                <a:latin typeface="Lucida Console" panose="020B0609040504020204" pitchFamily="49" charset="0"/>
+              </a:rPr>
+              <a:t>VirtualHost</a:t>
+            </a:r>
+            <a:r>
+              <a:rPr lang="nl-BE" sz="1400" dirty="0">
+                <a:solidFill>
+                  <a:schemeClr val="tx2"/>
+                </a:solidFill>
+                <a:latin typeface="Lucida Console" panose="020B0609040504020204" pitchFamily="49" charset="0"/>
+              </a:rPr>
+              <a:t> </a:t>
+            </a:r>
+            <a:r>
+              <a:rPr lang="nl-BE" sz="1400" dirty="0" err="1" smtClean="0">
+                <a:solidFill>
+                  <a:schemeClr val="tx2"/>
+                </a:solidFill>
+                <a:latin typeface="Lucida Console" panose="020B0609040504020204" pitchFamily="49" charset="0"/>
+              </a:rPr>
+              <a:t>dropbox.local</a:t>
+            </a:r>
+            <a:r>
+              <a:rPr lang="nl-BE" sz="1400" dirty="0">
+                <a:solidFill>
+                  <a:schemeClr val="tx2"/>
+                </a:solidFill>
+                <a:latin typeface="Lucida Console" panose="020B0609040504020204" pitchFamily="49" charset="0"/>
+              </a:rPr>
+              <a:t>:* &gt; </a:t>
+            </a:r>
+            <a:r>
               <a:rPr lang="nl-BE" sz="1400" dirty="0" smtClean="0">
                 <a:solidFill>
                   <a:schemeClr val="tx2"/>
                 </a:solidFill>
                 <a:latin typeface="Lucida Console" panose="020B0609040504020204" pitchFamily="49" charset="0"/>
               </a:rPr>
-              <a:t>&lt;</a:t>
+              <a:t/>
+            </a:r>
+            <a:br>
+              <a:rPr lang="nl-BE" sz="1400" dirty="0" smtClean="0">
+                <a:solidFill>
+                  <a:schemeClr val="tx2"/>
+                </a:solidFill>
+                <a:latin typeface="Lucida Console" panose="020B0609040504020204" pitchFamily="49" charset="0"/>
+              </a:rPr>
+            </a:br>
+            <a:r>
+              <a:rPr lang="nl-BE" sz="1400" dirty="0" smtClean="0">
+                <a:solidFill>
+                  <a:schemeClr val="tx2"/>
+                </a:solidFill>
+                <a:latin typeface="Lucida Console" panose="020B0609040504020204" pitchFamily="49" charset="0"/>
+              </a:rPr>
+              <a:t>		</a:t>
+            </a:r>
+            <a:r>
+              <a:rPr lang="nl-BE" sz="1400" dirty="0" err="1" smtClean="0">
+                <a:solidFill>
+                  <a:schemeClr val="tx2"/>
+                </a:solidFill>
+                <a:latin typeface="Lucida Console" panose="020B0609040504020204" pitchFamily="49" charset="0"/>
+              </a:rPr>
+              <a:t>DocumentRoot</a:t>
+            </a:r>
+            <a:r>
+              <a:rPr lang="nl-BE" sz="1400" dirty="0" smtClean="0">
+                <a:solidFill>
+                  <a:schemeClr val="tx2"/>
+                </a:solidFill>
+                <a:latin typeface="Lucida Console" panose="020B0609040504020204" pitchFamily="49" charset="0"/>
+              </a:rPr>
+              <a:t> </a:t>
             </a:r>
             <a:r>
               <a:rPr lang="nl-BE" sz="1400" dirty="0">
@@ -7202,7 +7339,7 @@
                 </a:solidFill>
                 <a:latin typeface="Lucida Console" panose="020B0609040504020204" pitchFamily="49" charset="0"/>
               </a:rPr>
-              <a:t>VirtualHost *&gt; </a:t>
+              <a:t>"C</a:t>
             </a:r>
             <a:r>
               <a:rPr lang="nl-BE" sz="1400" dirty="0" smtClean="0">
@@ -7211,6 +7348,232 @@
                 </a:solidFill>
                 <a:latin typeface="Lucida Console" panose="020B0609040504020204" pitchFamily="49" charset="0"/>
               </a:rPr>
+              <a:t>:\path-naar-dropbox-folder</a:t>
+            </a:r>
+            <a:br>
+              <a:rPr lang="nl-BE" sz="1400" dirty="0" smtClean="0">
+                <a:solidFill>
+                  <a:schemeClr val="tx2"/>
+                </a:solidFill>
+                <a:latin typeface="Lucida Console" panose="020B0609040504020204" pitchFamily="49" charset="0"/>
+              </a:rPr>
+            </a:br>
+            <a:r>
+              <a:rPr lang="nl-BE" sz="1400" dirty="0" smtClean="0">
+                <a:solidFill>
+                  <a:schemeClr val="tx2"/>
+                </a:solidFill>
+                <a:latin typeface="Lucida Console" panose="020B0609040504020204" pitchFamily="49" charset="0"/>
+              </a:rPr>
+              <a:t>		</a:t>
+            </a:r>
+            <a:r>
+              <a:rPr lang="nl-BE" sz="1400" dirty="0" err="1" smtClean="0">
+                <a:solidFill>
+                  <a:schemeClr val="tx2"/>
+                </a:solidFill>
+                <a:latin typeface="Lucida Console" panose="020B0609040504020204" pitchFamily="49" charset="0"/>
+              </a:rPr>
+              <a:t>ServerName</a:t>
+            </a:r>
+            <a:r>
+              <a:rPr lang="nl-BE" sz="1400" dirty="0" smtClean="0">
+                <a:solidFill>
+                  <a:schemeClr val="tx2"/>
+                </a:solidFill>
+                <a:latin typeface="Lucida Console" panose="020B0609040504020204" pitchFamily="49" charset="0"/>
+              </a:rPr>
+              <a:t> </a:t>
+            </a:r>
+            <a:r>
+              <a:rPr lang="nl-BE" sz="1400" dirty="0" err="1" smtClean="0">
+                <a:solidFill>
+                  <a:schemeClr val="tx2"/>
+                </a:solidFill>
+                <a:latin typeface="Lucida Console" panose="020B0609040504020204" pitchFamily="49" charset="0"/>
+              </a:rPr>
+              <a:t>dropbox.local</a:t>
+            </a:r>
+            <a:r>
+              <a:rPr lang="nl-BE" sz="1400" dirty="0" smtClean="0">
+                <a:solidFill>
+                  <a:schemeClr val="tx2"/>
+                </a:solidFill>
+                <a:latin typeface="Lucida Console" panose="020B0609040504020204" pitchFamily="49" charset="0"/>
+              </a:rPr>
+              <a:t> </a:t>
+            </a:r>
+            <a:br>
+              <a:rPr lang="nl-BE" sz="1400" dirty="0" smtClean="0">
+                <a:solidFill>
+                  <a:schemeClr val="tx2"/>
+                </a:solidFill>
+                <a:latin typeface="Lucida Console" panose="020B0609040504020204" pitchFamily="49" charset="0"/>
+              </a:rPr>
+            </a:br>
+            <a:r>
+              <a:rPr lang="nl-BE" sz="1400" dirty="0" smtClean="0">
+                <a:solidFill>
+                  <a:schemeClr val="tx2"/>
+                </a:solidFill>
+                <a:latin typeface="Lucida Console" panose="020B0609040504020204" pitchFamily="49" charset="0"/>
+              </a:rPr>
+              <a:t>		</a:t>
+            </a:r>
+            <a:br>
+              <a:rPr lang="nl-BE" sz="1400" dirty="0" smtClean="0">
+                <a:solidFill>
+                  <a:schemeClr val="tx2"/>
+                </a:solidFill>
+                <a:latin typeface="Lucida Console" panose="020B0609040504020204" pitchFamily="49" charset="0"/>
+              </a:rPr>
+            </a:br>
+            <a:r>
+              <a:rPr lang="nl-BE" sz="1400" dirty="0" smtClean="0">
+                <a:solidFill>
+                  <a:schemeClr val="tx2"/>
+                </a:solidFill>
+                <a:latin typeface="Lucida Console" panose="020B0609040504020204" pitchFamily="49" charset="0"/>
+              </a:rPr>
+              <a:t>		&lt;</a:t>
+            </a:r>
+            <a:r>
+              <a:rPr lang="nl-BE" sz="1400" dirty="0">
+                <a:solidFill>
+                  <a:schemeClr val="tx2"/>
+                </a:solidFill>
+                <a:latin typeface="Lucida Console" panose="020B0609040504020204" pitchFamily="49" charset="0"/>
+              </a:rPr>
+              <a:t>Directory </a:t>
+            </a:r>
+            <a:r>
+              <a:rPr lang="nl-BE" sz="1400" dirty="0" smtClean="0">
+                <a:solidFill>
+                  <a:schemeClr val="tx2"/>
+                </a:solidFill>
+                <a:latin typeface="Lucida Console" panose="020B0609040504020204" pitchFamily="49" charset="0"/>
+              </a:rPr>
+              <a:t>"C:\path-naar-dropbox-folder"&gt;</a:t>
+            </a:r>
+            <a:endParaRPr lang="nl-BE" sz="1400" dirty="0">
+              <a:solidFill>
+                <a:schemeClr val="tx2"/>
+              </a:solidFill>
+              <a:latin typeface="Lucida Console" panose="020B0609040504020204" pitchFamily="49" charset="0"/>
+            </a:endParaRPr>
+          </a:p>
+          <a:p>
+            <a:pPr marL="914400" lvl="2" indent="0">
+              <a:buNone/>
+            </a:pPr>
+            <a:r>
+              <a:rPr lang="nl-BE" sz="1400" dirty="0" smtClean="0">
+                <a:solidFill>
+                  <a:schemeClr val="tx2"/>
+                </a:solidFill>
+                <a:latin typeface="Lucida Console" panose="020B0609040504020204" pitchFamily="49" charset="0"/>
+              </a:rPr>
+              <a:t>			</a:t>
+            </a:r>
+            <a:r>
+              <a:rPr lang="nl-BE" sz="1400" dirty="0" err="1" smtClean="0">
+                <a:solidFill>
+                  <a:schemeClr val="tx2"/>
+                </a:solidFill>
+                <a:latin typeface="Lucida Console" panose="020B0609040504020204" pitchFamily="49" charset="0"/>
+              </a:rPr>
+              <a:t>AllowOverride</a:t>
+            </a:r>
+            <a:r>
+              <a:rPr lang="nl-BE" sz="1400" dirty="0" smtClean="0">
+                <a:solidFill>
+                  <a:schemeClr val="tx2"/>
+                </a:solidFill>
+                <a:latin typeface="Lucida Console" panose="020B0609040504020204" pitchFamily="49" charset="0"/>
+              </a:rPr>
+              <a:t> </a:t>
+            </a:r>
+            <a:r>
+              <a:rPr lang="nl-BE" sz="1400" dirty="0" err="1">
+                <a:solidFill>
+                  <a:schemeClr val="tx2"/>
+                </a:solidFill>
+                <a:latin typeface="Lucida Console" panose="020B0609040504020204" pitchFamily="49" charset="0"/>
+              </a:rPr>
+              <a:t>All</a:t>
+            </a:r>
+            <a:endParaRPr lang="nl-BE" sz="1400" dirty="0">
+              <a:solidFill>
+                <a:schemeClr val="tx2"/>
+              </a:solidFill>
+              <a:latin typeface="Lucida Console" panose="020B0609040504020204" pitchFamily="49" charset="0"/>
+            </a:endParaRPr>
+          </a:p>
+          <a:p>
+            <a:pPr marL="914400" lvl="2" indent="0">
+              <a:buNone/>
+            </a:pPr>
+            <a:r>
+              <a:rPr lang="nl-BE" sz="1400" dirty="0" smtClean="0">
+                <a:solidFill>
+                  <a:schemeClr val="tx2"/>
+                </a:solidFill>
+                <a:latin typeface="Lucida Console" panose="020B0609040504020204" pitchFamily="49" charset="0"/>
+              </a:rPr>
+              <a:t>			</a:t>
+            </a:r>
+            <a:r>
+              <a:rPr lang="nl-BE" sz="1400" dirty="0" err="1" smtClean="0">
+                <a:solidFill>
+                  <a:schemeClr val="tx2"/>
+                </a:solidFill>
+                <a:latin typeface="Lucida Console" panose="020B0609040504020204" pitchFamily="49" charset="0"/>
+              </a:rPr>
+              <a:t>Require</a:t>
+            </a:r>
+            <a:r>
+              <a:rPr lang="nl-BE" sz="1400" dirty="0" smtClean="0">
+                <a:solidFill>
+                  <a:schemeClr val="tx2"/>
+                </a:solidFill>
+                <a:latin typeface="Lucida Console" panose="020B0609040504020204" pitchFamily="49" charset="0"/>
+              </a:rPr>
+              <a:t> </a:t>
+            </a:r>
+            <a:r>
+              <a:rPr lang="nl-BE" sz="1400" dirty="0" err="1">
+                <a:solidFill>
+                  <a:schemeClr val="tx2"/>
+                </a:solidFill>
+                <a:latin typeface="Lucida Console" panose="020B0609040504020204" pitchFamily="49" charset="0"/>
+              </a:rPr>
+              <a:t>all</a:t>
+            </a:r>
+            <a:r>
+              <a:rPr lang="nl-BE" sz="1400" dirty="0">
+                <a:solidFill>
+                  <a:schemeClr val="tx2"/>
+                </a:solidFill>
+                <a:latin typeface="Lucida Console" panose="020B0609040504020204" pitchFamily="49" charset="0"/>
+              </a:rPr>
+              <a:t> </a:t>
+            </a:r>
+            <a:r>
+              <a:rPr lang="nl-BE" sz="1400" dirty="0" err="1" smtClean="0">
+                <a:solidFill>
+                  <a:schemeClr val="tx2"/>
+                </a:solidFill>
+                <a:latin typeface="Lucida Console" panose="020B0609040504020204" pitchFamily="49" charset="0"/>
+              </a:rPr>
+              <a:t>granted</a:t>
+            </a:r>
+            <a:r>
+              <a:rPr lang="nl-BE" sz="1400" dirty="0" smtClean="0">
+                <a:solidFill>
+                  <a:schemeClr val="tx2"/>
+                </a:solidFill>
+                <a:latin typeface="Lucida Console" panose="020B0609040504020204" pitchFamily="49" charset="0"/>
+              </a:rPr>
               <a:t/>
             </a:r>
             <a:br>
@@ -7228,16 +7591,55 @@
                 </a:solidFill>
                 <a:latin typeface="Lucida Console" panose="020B0609040504020204" pitchFamily="49" charset="0"/>
               </a:rPr>
-              <a:t>		DocumentRoot "C:\dropbox" </a:t>
-            </a:r>
-            <a:br>
+              <a:t>			Options </a:t>
+            </a:r>
+            <a:r>
+              <a:rPr lang="nl-BE" sz="1400" dirty="0">
+                <a:solidFill>
+                  <a:schemeClr val="tx2"/>
+                </a:solidFill>
+                <a:latin typeface="Lucida Console" panose="020B0609040504020204" pitchFamily="49" charset="0"/>
+              </a:rPr>
+              <a:t>+</a:t>
+            </a:r>
+            <a:r>
+              <a:rPr lang="nl-BE" sz="1400" dirty="0" err="1">
+                <a:solidFill>
+                  <a:schemeClr val="tx2"/>
+                </a:solidFill>
+                <a:latin typeface="Lucida Console" panose="020B0609040504020204" pitchFamily="49" charset="0"/>
+              </a:rPr>
+              <a:t>Indexes</a:t>
+            </a:r>
+            <a:endParaRPr lang="nl-BE" sz="1400" dirty="0">
+              <a:solidFill>
+                <a:schemeClr val="tx2"/>
+              </a:solidFill>
+              <a:latin typeface="Lucida Console" panose="020B0609040504020204" pitchFamily="49" charset="0"/>
+            </a:endParaRPr>
+          </a:p>
+          <a:p>
+            <a:pPr marL="914400" lvl="2" indent="0">
+              <a:buNone/>
+            </a:pPr>
+            <a:r>
               <a:rPr lang="nl-BE" sz="1400" dirty="0" smtClean="0">
                 <a:solidFill>
                   <a:schemeClr val="tx2"/>
                 </a:solidFill>
                 <a:latin typeface="Lucida Console" panose="020B0609040504020204" pitchFamily="49" charset="0"/>
               </a:rPr>
-            </a:br>
+              <a:t>			</a:t>
+            </a:r>
+            <a:r>
+              <a:rPr lang="nl-BE" sz="1400" dirty="0" err="1" smtClean="0">
+                <a:solidFill>
+                  <a:schemeClr val="tx2"/>
+                </a:solidFill>
+                <a:latin typeface="Lucida Console" panose="020B0609040504020204" pitchFamily="49" charset="0"/>
+              </a:rPr>
+              <a:t>IndexOptions</a:t>
+            </a:r>
             <a:r>
               <a:rPr lang="nl-BE" sz="1400" dirty="0" smtClean="0">
                 <a:solidFill>
@@ -7245,24 +7647,42 @@
                 </a:solidFill>
                 <a:latin typeface="Lucida Console" panose="020B0609040504020204" pitchFamily="49" charset="0"/>
               </a:rPr>
-              <a:t>		ServerName dropbox.local 		</a:t>
-            </a:r>
-            <a:br>
+              <a:t> </a:t>
+            </a:r>
+            <a:r>
+              <a:rPr lang="nl-BE" sz="1400" dirty="0" err="1">
+                <a:solidFill>
+                  <a:schemeClr val="tx2"/>
+                </a:solidFill>
+                <a:latin typeface="Lucida Console" panose="020B0609040504020204" pitchFamily="49" charset="0"/>
+              </a:rPr>
+              <a:t>NameWidth</a:t>
+            </a:r>
+            <a:r>
               <a:rPr lang="nl-BE" sz="1400" dirty="0" smtClean="0">
                 <a:solidFill>
                   <a:schemeClr val="tx2"/>
                 </a:solidFill>
                 <a:latin typeface="Lucida Console" panose="020B0609040504020204" pitchFamily="49" charset="0"/>
               </a:rPr>
-            </a:br>
-            <a:r>
+              <a:t>=*</a:t>
+            </a:r>
+            <a:br>
               <a:rPr lang="nl-BE" sz="1400" dirty="0" smtClean="0">
                 <a:solidFill>
                   <a:schemeClr val="tx2"/>
                 </a:solidFill>
                 <a:latin typeface="Lucida Console" panose="020B0609040504020204" pitchFamily="49" charset="0"/>
               </a:rPr>
-              <a:t>		&lt;</a:t>
+            </a:br>
+            <a:r>
+              <a:rPr lang="nl-BE" sz="1400" dirty="0" smtClean="0">
+                <a:solidFill>
+                  <a:schemeClr val="tx2"/>
+                </a:solidFill>
+                <a:latin typeface="Lucida Console" panose="020B0609040504020204" pitchFamily="49" charset="0"/>
+              </a:rPr>
+              <a:t>		&lt;/</a:t>
             </a:r>
             <a:r>
               <a:rPr lang="nl-BE" sz="1400" dirty="0">
@@ -7271,7 +7691,7 @@
                 </a:solidFill>
                 <a:latin typeface="Lucida Console" panose="020B0609040504020204" pitchFamily="49" charset="0"/>
               </a:rPr>
-              <a:t>Directory "C</a:t>
+              <a:t>Directory&gt; </a:t>
             </a:r>
             <a:r>
               <a:rPr lang="nl-BE" sz="1400" dirty="0" smtClean="0">
@@ -7280,7 +7700,7 @@
                 </a:solidFill>
                 <a:latin typeface="Lucida Console" panose="020B0609040504020204" pitchFamily="49" charset="0"/>
               </a:rPr>
-              <a:t>:\dropbox"&gt; </a:t>
+              <a:t/>
             </a:r>
             <a:br>
               <a:rPr lang="nl-BE" sz="1400" dirty="0" smtClean="0">
@@ -7297,94 +7717,34 @@
                 </a:solidFill>
                 <a:latin typeface="Lucida Console" panose="020B0609040504020204" pitchFamily="49" charset="0"/>
               </a:rPr>
-              <a:t>			Require all granted</a:t>
-            </a:r>
-            <a:br>
+              <a:t>	&lt;/</a:t>
+            </a:r>
+            <a:r>
+              <a:rPr lang="nl-BE" sz="1400" dirty="0" err="1">
+                <a:solidFill>
+                  <a:schemeClr val="tx2"/>
+                </a:solidFill>
+                <a:latin typeface="Lucida Console" panose="020B0609040504020204" pitchFamily="49" charset="0"/>
+              </a:rPr>
+              <a:t>VirtualHost</a:t>
+            </a:r>
+            <a:r>
+              <a:rPr lang="nl-BE" sz="1400" dirty="0">
+                <a:solidFill>
+                  <a:schemeClr val="tx2"/>
+                </a:solidFill>
+                <a:latin typeface="Lucida Console" panose="020B0609040504020204" pitchFamily="49" charset="0"/>
+              </a:rPr>
+              <a:t>&gt;</a:t>
+            </a:r>
+            <a:r>
               <a:rPr lang="nl-BE" sz="1400" dirty="0" smtClean="0">
                 <a:solidFill>
                   <a:schemeClr val="tx2"/>
                 </a:solidFill>
                 <a:latin typeface="Lucida Console" panose="020B0609040504020204" pitchFamily="49" charset="0"/>
               </a:rPr>
-            </a:br>
-            <a:r>
-              <a:rPr lang="nl-BE" sz="1400" dirty="0" smtClean="0">
-                <a:solidFill>
-                  <a:schemeClr val="tx2"/>
-                </a:solidFill>
-                <a:latin typeface="Lucida Console" panose="020B0609040504020204" pitchFamily="49" charset="0"/>
-              </a:rPr>
-              <a:t>			Options Indexes FollowSymLinks</a:t>
-            </a:r>
-            <a:br>
-              <a:rPr lang="nl-BE" sz="1400" dirty="0" smtClean="0">
-                <a:solidFill>
-                  <a:schemeClr val="tx2"/>
-                </a:solidFill>
-                <a:latin typeface="Lucida Console" panose="020B0609040504020204" pitchFamily="49" charset="0"/>
-              </a:rPr>
-            </a:br>
-            <a:r>
-              <a:rPr lang="nl-BE" sz="1400" dirty="0" smtClean="0">
-                <a:solidFill>
-                  <a:schemeClr val="tx2"/>
-                </a:solidFill>
-                <a:latin typeface="Lucida Console" panose="020B0609040504020204" pitchFamily="49" charset="0"/>
-              </a:rPr>
-              <a:t>		&lt;/</a:t>
-            </a:r>
-            <a:r>
-              <a:rPr lang="nl-BE" sz="1400" dirty="0">
-                <a:solidFill>
-                  <a:schemeClr val="tx2"/>
-                </a:solidFill>
-                <a:latin typeface="Lucida Console" panose="020B0609040504020204" pitchFamily="49" charset="0"/>
-              </a:rPr>
-              <a:t>Directory&gt; </a:t>
-            </a:r>
-            <a:r>
-              <a:rPr lang="nl-BE" sz="1400" dirty="0" smtClean="0">
-                <a:solidFill>
-                  <a:schemeClr val="tx2"/>
-                </a:solidFill>
-                <a:latin typeface="Lucida Console" panose="020B0609040504020204" pitchFamily="49" charset="0"/>
-              </a:rPr>
               <a:t/>
-            </a:r>
-            <a:br>
-              <a:rPr lang="nl-BE" sz="1400" dirty="0" smtClean="0">
-                <a:solidFill>
-                  <a:schemeClr val="tx2"/>
-                </a:solidFill>
-                <a:latin typeface="Lucida Console" panose="020B0609040504020204" pitchFamily="49" charset="0"/>
-              </a:rPr>
-            </a:br>
-            <a:r>
-              <a:rPr lang="nl-BE" sz="1400" dirty="0" smtClean="0">
-                <a:solidFill>
-                  <a:schemeClr val="tx2"/>
-                </a:solidFill>
-                <a:latin typeface="Lucida Console" panose="020B0609040504020204" pitchFamily="49" charset="0"/>
-              </a:rPr>
-              <a:t>	&lt;/</a:t>
-            </a:r>
-            <a:r>
-              <a:rPr lang="nl-BE" sz="1400" dirty="0">
-                <a:solidFill>
-                  <a:schemeClr val="tx2"/>
-                </a:solidFill>
-                <a:latin typeface="Lucida Console" panose="020B0609040504020204" pitchFamily="49" charset="0"/>
-              </a:rPr>
-              <a:t>VirtualHost</a:t>
-            </a:r>
-            <a:r>
-              <a:rPr lang="nl-BE" sz="1400" dirty="0" smtClean="0">
-                <a:solidFill>
-                  <a:schemeClr val="tx2"/>
-                </a:solidFill>
-                <a:latin typeface="Lucida Console" panose="020B0609040504020204" pitchFamily="49" charset="0"/>
-              </a:rPr>
-              <a:t>&gt;</a:t>
             </a:r>
             <a:br>
               <a:rPr lang="nl-BE" sz="1400" dirty="0" smtClean="0">
@@ -7671,7 +8031,7 @@
         </p:spPr>
         <p:txBody>
           <a:bodyPr>
-            <a:normAutofit lnSpcReduction="10000"/>
+            <a:normAutofit fontScale="92500" lnSpcReduction="10000"/>
           </a:bodyPr>
           <a:lstStyle/>
           <a:p>
@@ -7744,16 +8104,44 @@
                 </a:solidFill>
                 <a:latin typeface="Lucida Console" panose="020B0609040504020204" pitchFamily="49" charset="0"/>
               </a:rPr>
-              <a:t>&lt;VirtualHost *&gt; </a:t>
-            </a:r>
-            <a:br>
+              <a:t>&lt;</a:t>
+            </a:r>
+            <a:r>
+              <a:rPr lang="nl-BE" sz="1400" dirty="0" err="1">
+                <a:solidFill>
+                  <a:schemeClr val="tx2"/>
+                </a:solidFill>
+                <a:latin typeface="Lucida Console" panose="020B0609040504020204" pitchFamily="49" charset="0"/>
+              </a:rPr>
+              <a:t>VirtualHost</a:t>
+            </a:r>
+            <a:r>
               <a:rPr lang="nl-BE" sz="1400" dirty="0">
                 <a:solidFill>
                   <a:schemeClr val="tx2"/>
                 </a:solidFill>
                 <a:latin typeface="Lucida Console" panose="020B0609040504020204" pitchFamily="49" charset="0"/>
               </a:rPr>
-            </a:br>
+              <a:t> </a:t>
+            </a:r>
+            <a:r>
+              <a:rPr lang="nl-BE" sz="1400" dirty="0" err="1" smtClean="0">
+                <a:solidFill>
+                  <a:schemeClr val="tx2"/>
+                </a:solidFill>
+                <a:latin typeface="Lucida Console" panose="020B0609040504020204" pitchFamily="49" charset="0"/>
+              </a:rPr>
+              <a:t>supercoolproject.local</a:t>
+            </a:r>
+            <a:r>
+              <a:rPr lang="nl-BE" sz="1400" dirty="0" smtClean="0">
+                <a:solidFill>
+                  <a:schemeClr val="tx2"/>
+                </a:solidFill>
+                <a:latin typeface="Lucida Console" panose="020B0609040504020204" pitchFamily="49" charset="0"/>
+              </a:rPr>
+              <a:t>:* </a:t>
+            </a:r>
             <a:r>
               <a:rPr lang="nl-BE" sz="1400" dirty="0">
                 <a:solidFill>
@@ -7761,17 +8149,16 @@
                 </a:solidFill>
                 <a:latin typeface="Lucida Console" panose="020B0609040504020204" pitchFamily="49" charset="0"/>
               </a:rPr>
-              <a:t>		DocumentRoot </a:t>
-            </a:r>
-            <a:r>
+              <a:t>&gt; </a:t>
+            </a:r>
+            <a:br>
               <a:rPr lang="nl-BE" sz="1400" dirty="0">
                 <a:solidFill>
                   <a:schemeClr val="tx2"/>
                 </a:solidFill>
                 <a:latin typeface="Lucida Console" panose="020B0609040504020204" pitchFamily="49" charset="0"/>
               </a:rPr>
-              <a:t>"C:\supercoolproject" </a:t>
-            </a:r>
+            </a:br>
             <a:r>
               <a:rPr lang="nl-BE" sz="1400" dirty="0">
                 <a:solidFill>
@@ -7779,6 +8166,42 @@
                 </a:solidFill>
                 <a:latin typeface="Lucida Console" panose="020B0609040504020204" pitchFamily="49" charset="0"/>
               </a:rPr>
+              <a:t>		</a:t>
+            </a:r>
+            <a:r>
+              <a:rPr lang="nl-BE" sz="1400" dirty="0" err="1">
+                <a:solidFill>
+                  <a:schemeClr val="tx2"/>
+                </a:solidFill>
+                <a:latin typeface="Lucida Console" panose="020B0609040504020204" pitchFamily="49" charset="0"/>
+              </a:rPr>
+              <a:t>DocumentRoot</a:t>
+            </a:r>
+            <a:r>
+              <a:rPr lang="nl-BE" sz="1400" dirty="0">
+                <a:solidFill>
+                  <a:schemeClr val="tx2"/>
+                </a:solidFill>
+                <a:latin typeface="Lucida Console" panose="020B0609040504020204" pitchFamily="49" charset="0"/>
+              </a:rPr>
+              <a:t> "C</a:t>
+            </a:r>
+            <a:r>
+              <a:rPr lang="nl-BE" sz="1400" dirty="0" smtClean="0">
+                <a:solidFill>
+                  <a:schemeClr val="tx2"/>
+                </a:solidFill>
+                <a:latin typeface="Lucida Console" panose="020B0609040504020204" pitchFamily="49" charset="0"/>
+              </a:rPr>
+              <a:t>:\supercoolproject</a:t>
+            </a:r>
+            <a:r>
+              <a:rPr lang="nl-BE" sz="1400" dirty="0">
+                <a:solidFill>
+                  <a:schemeClr val="tx2"/>
+                </a:solidFill>
+                <a:latin typeface="Lucida Console" panose="020B0609040504020204" pitchFamily="49" charset="0"/>
+              </a:rPr>
               <a:t/>
             </a:r>
             <a:br>
@@ -7796,7 +8219,16 @@
                 </a:solidFill>
                 <a:latin typeface="Lucida Console" panose="020B0609040504020204" pitchFamily="49" charset="0"/>
               </a:rPr>
-              <a:t>		ServerName </a:t>
+              <a:t>		</a:t>
+            </a:r>
+            <a:r>
+              <a:rPr lang="nl-BE" sz="1400" dirty="0" err="1">
+                <a:solidFill>
+                  <a:schemeClr val="tx2"/>
+                </a:solidFill>
+                <a:latin typeface="Lucida Console" panose="020B0609040504020204" pitchFamily="49" charset="0"/>
+              </a:rPr>
+              <a:t>ServerName</a:t>
             </a:r>
             <a:r>
               <a:rPr lang="nl-BE" sz="1400" dirty="0">
@@ -7805,7 +8237,16 @@
                 </a:solidFill>
                 <a:latin typeface="Lucida Console" panose="020B0609040504020204" pitchFamily="49" charset="0"/>
               </a:rPr>
-              <a:t>supercoolproject.local </a:t>
+              <a:t> </a:t>
+            </a:r>
+            <a:r>
+              <a:rPr lang="nl-BE" sz="1400" dirty="0" err="1" smtClean="0">
+                <a:solidFill>
+                  <a:schemeClr val="tx2"/>
+                </a:solidFill>
+                <a:latin typeface="Lucida Console" panose="020B0609040504020204" pitchFamily="49" charset="0"/>
+              </a:rPr>
+              <a:t>supercoolproject.local</a:t>
             </a:r>
             <a:r>
               <a:rPr lang="nl-BE" sz="1400" dirty="0">
@@ -7814,6 +8255,23 @@
                 </a:solidFill>
                 <a:latin typeface="Lucida Console" panose="020B0609040504020204" pitchFamily="49" charset="0"/>
               </a:rPr>
+              <a:t/>
+            </a:r>
+            <a:br>
+              <a:rPr lang="nl-BE" sz="1400" dirty="0">
+                <a:solidFill>
+                  <a:schemeClr val="tx2"/>
+                </a:solidFill>
+                <a:latin typeface="Lucida Console" panose="020B0609040504020204" pitchFamily="49" charset="0"/>
+              </a:rPr>
+            </a:br>
+            <a:r>
+              <a:rPr lang="nl-BE" sz="1400" dirty="0">
+                <a:solidFill>
+                  <a:schemeClr val="tx2"/>
+                </a:solidFill>
+                <a:latin typeface="Lucida Console" panose="020B0609040504020204" pitchFamily="49" charset="0"/>
+              </a:rPr>
               <a:t>		</a:t>
             </a:r>
             <a:br>
@@ -7834,13 +8292,42 @@
               <a:t>		&lt;Directory "C</a:t>
             </a:r>
             <a:r>
+              <a:rPr lang="nl-BE" sz="1400" dirty="0" smtClean="0">
+                <a:solidFill>
+                  <a:schemeClr val="tx2"/>
+                </a:solidFill>
+                <a:latin typeface="Lucida Console" panose="020B0609040504020204" pitchFamily="49" charset="0"/>
+              </a:rPr>
+              <a:t>:\supercoolproject"&gt;</a:t>
+            </a:r>
+            <a:endParaRPr lang="nl-BE" sz="1400" dirty="0">
+              <a:solidFill>
+                <a:schemeClr val="tx2"/>
+              </a:solidFill>
+              <a:latin typeface="Lucida Console" panose="020B0609040504020204" pitchFamily="49" charset="0"/>
+            </a:endParaRPr>
+          </a:p>
+          <a:p>
+            <a:pPr marL="914400" lvl="2" indent="0">
+              <a:buNone/>
+            </a:pPr>
+            <a:r>
               <a:rPr lang="nl-BE" sz="1400" dirty="0">
                 <a:solidFill>
                   <a:schemeClr val="tx2"/>
                 </a:solidFill>
                 <a:latin typeface="Lucida Console" panose="020B0609040504020204" pitchFamily="49" charset="0"/>
               </a:rPr>
-              <a:t>:\</a:t>
+              <a:t>			</a:t>
+            </a:r>
+            <a:r>
+              <a:rPr lang="nl-BE" sz="1400" dirty="0" err="1">
+                <a:solidFill>
+                  <a:schemeClr val="tx2"/>
+                </a:solidFill>
+                <a:latin typeface="Lucida Console" panose="020B0609040504020204" pitchFamily="49" charset="0"/>
+              </a:rPr>
+              <a:t>AllowOverride</a:t>
             </a:r>
             <a:r>
               <a:rPr lang="nl-BE" sz="1400" dirty="0">
@@ -7849,8 +8336,28 @@
                 </a:solidFill>
                 <a:latin typeface="Lucida Console" panose="020B0609040504020204" pitchFamily="49" charset="0"/>
               </a:rPr>
-              <a:t> supercoolproject </a:t>
-            </a:r>
+              <a:t> </a:t>
+            </a:r>
+            <a:r>
+              <a:rPr lang="nl-BE" sz="1400" dirty="0" err="1">
+                <a:solidFill>
+                  <a:schemeClr val="tx2"/>
+                </a:solidFill>
+                <a:latin typeface="Lucida Console" panose="020B0609040504020204" pitchFamily="49" charset="0"/>
+              </a:rPr>
+              <a:t>All</a:t>
+            </a:r>
+            <a:endParaRPr lang="nl-BE" sz="1400" dirty="0">
+              <a:solidFill>
+                <a:schemeClr val="tx2"/>
+              </a:solidFill>
+              <a:latin typeface="Lucida Console" panose="020B0609040504020204" pitchFamily="49" charset="0"/>
+            </a:endParaRPr>
+          </a:p>
+          <a:p>
+            <a:pPr marL="914400" lvl="2" indent="0">
+              <a:buNone/>
+            </a:pPr>
             <a:r>
               <a:rPr lang="nl-BE" sz="1400" dirty="0">
                 <a:solidFill>
@@ -7858,7 +8365,16 @@
                 </a:solidFill>
                 <a:latin typeface="Lucida Console" panose="020B0609040504020204" pitchFamily="49" charset="0"/>
               </a:rPr>
-              <a:t>"&gt; </a:t>
+              <a:t>			</a:t>
+            </a:r>
+            <a:r>
+              <a:rPr lang="nl-BE" sz="1400" dirty="0" err="1">
+                <a:solidFill>
+                  <a:schemeClr val="tx2"/>
+                </a:solidFill>
+                <a:latin typeface="Lucida Console" panose="020B0609040504020204" pitchFamily="49" charset="0"/>
+              </a:rPr>
+              <a:t>Require</a:t>
             </a:r>
             <a:r>
               <a:rPr lang="nl-BE" sz="1400" dirty="0">
@@ -7867,6 +8383,42 @@
                 </a:solidFill>
                 <a:latin typeface="Lucida Console" panose="020B0609040504020204" pitchFamily="49" charset="0"/>
               </a:rPr>
+              <a:t> </a:t>
+            </a:r>
+            <a:r>
+              <a:rPr lang="nl-BE" sz="1400" dirty="0" err="1">
+                <a:solidFill>
+                  <a:schemeClr val="tx2"/>
+                </a:solidFill>
+                <a:latin typeface="Lucida Console" panose="020B0609040504020204" pitchFamily="49" charset="0"/>
+              </a:rPr>
+              <a:t>all</a:t>
+            </a:r>
+            <a:r>
+              <a:rPr lang="nl-BE" sz="1400" dirty="0">
+                <a:solidFill>
+                  <a:schemeClr val="tx2"/>
+                </a:solidFill>
+                <a:latin typeface="Lucida Console" panose="020B0609040504020204" pitchFamily="49" charset="0"/>
+              </a:rPr>
+              <a:t> </a:t>
+            </a:r>
+            <a:r>
+              <a:rPr lang="nl-BE" sz="1400" dirty="0" err="1">
+                <a:solidFill>
+                  <a:schemeClr val="tx2"/>
+                </a:solidFill>
+                <a:latin typeface="Lucida Console" panose="020B0609040504020204" pitchFamily="49" charset="0"/>
+              </a:rPr>
+              <a:t>granted</a:t>
+            </a:r>
+            <a:r>
+              <a:rPr lang="nl-BE" sz="1400" dirty="0">
+                <a:solidFill>
+                  <a:schemeClr val="tx2"/>
+                </a:solidFill>
+                <a:latin typeface="Lucida Console" panose="020B0609040504020204" pitchFamily="49" charset="0"/>
+              </a:rPr>
               <a:t/>
             </a:r>
             <a:br>
@@ -7884,16 +8436,46 @@
                 </a:solidFill>
                 <a:latin typeface="Lucida Console" panose="020B0609040504020204" pitchFamily="49" charset="0"/>
               </a:rPr>
-              <a:t>			Require all granted</a:t>
-            </a:r>
-            <a:br>
+              <a:t>			Options +</a:t>
+            </a:r>
+            <a:r>
+              <a:rPr lang="nl-BE" sz="1400" dirty="0" err="1">
+                <a:solidFill>
+                  <a:schemeClr val="tx2"/>
+                </a:solidFill>
+                <a:latin typeface="Lucida Console" panose="020B0609040504020204" pitchFamily="49" charset="0"/>
+              </a:rPr>
+              <a:t>Indexes</a:t>
+            </a:r>
+            <a:endParaRPr lang="nl-BE" sz="1400" dirty="0">
+              <a:solidFill>
+                <a:schemeClr val="tx2"/>
+              </a:solidFill>
+              <a:latin typeface="Lucida Console" panose="020B0609040504020204" pitchFamily="49" charset="0"/>
+            </a:endParaRPr>
+          </a:p>
+          <a:p>
+            <a:pPr marL="914400" lvl="2" indent="0">
+              <a:buNone/>
+            </a:pPr>
+            <a:r>
               <a:rPr lang="nl-BE" sz="1400" dirty="0">
                 <a:solidFill>
                   <a:schemeClr val="tx2"/>
                 </a:solidFill>
                 <a:latin typeface="Lucida Console" panose="020B0609040504020204" pitchFamily="49" charset="0"/>
               </a:rPr>
-            </a:br>
+              <a:t>			</a:t>
+            </a:r>
+            <a:r>
+              <a:rPr lang="nl-BE" sz="1400" dirty="0" err="1">
+                <a:solidFill>
+                  <a:schemeClr val="tx2"/>
+                </a:solidFill>
+                <a:latin typeface="Lucida Console" panose="020B0609040504020204" pitchFamily="49" charset="0"/>
+              </a:rPr>
+              <a:t>IndexOptions</a:t>
+            </a:r>
             <a:r>
               <a:rPr lang="nl-BE" sz="1400" dirty="0">
                 <a:solidFill>
@@ -7901,23 +8483,41 @@
                 </a:solidFill>
                 <a:latin typeface="Lucida Console" panose="020B0609040504020204" pitchFamily="49" charset="0"/>
               </a:rPr>
-              <a:t>			Options Indexes FollowSymLinks</a:t>
-            </a:r>
-            <a:br>
+              <a:t> </a:t>
+            </a:r>
+            <a:r>
+              <a:rPr lang="nl-BE" sz="1400" dirty="0" err="1">
+                <a:solidFill>
+                  <a:schemeClr val="tx2"/>
+                </a:solidFill>
+                <a:latin typeface="Lucida Console" panose="020B0609040504020204" pitchFamily="49" charset="0"/>
+              </a:rPr>
+              <a:t>NameWidth</a:t>
+            </a:r>
+            <a:r>
               <a:rPr lang="nl-BE" sz="1400" dirty="0">
                 <a:solidFill>
                   <a:schemeClr val="tx2"/>
                 </a:solidFill>
                 <a:latin typeface="Lucida Console" panose="020B0609040504020204" pitchFamily="49" charset="0"/>
               </a:rPr>
-            </a:br>
-            <a:r>
+              <a:t>=*</a:t>
+            </a:r>
+            <a:br>
               <a:rPr lang="nl-BE" sz="1400" dirty="0">
                 <a:solidFill>
                   <a:schemeClr val="tx2"/>
                 </a:solidFill>
                 <a:latin typeface="Lucida Console" panose="020B0609040504020204" pitchFamily="49" charset="0"/>
               </a:rPr>
+            </a:br>
+            <a:r>
+              <a:rPr lang="nl-BE" sz="1400" dirty="0">
+                <a:solidFill>
+                  <a:schemeClr val="tx2"/>
+                </a:solidFill>
+                <a:latin typeface="Lucida Console" panose="020B0609040504020204" pitchFamily="49" charset="0"/>
+              </a:rPr>
               <a:t>		&lt;/Directory&gt; </a:t>
             </a:r>
             <a:br>
@@ -7935,7 +8535,25 @@
                 </a:solidFill>
                 <a:latin typeface="Lucida Console" panose="020B0609040504020204" pitchFamily="49" charset="0"/>
               </a:rPr>
-              <a:t>	&lt;/VirtualHost&gt;</a:t>
+              <a:t>	&lt;/</a:t>
+            </a:r>
+            <a:r>
+              <a:rPr lang="nl-BE" sz="1400" dirty="0" err="1">
+                <a:solidFill>
+                  <a:schemeClr val="tx2"/>
+                </a:solidFill>
+                <a:latin typeface="Lucida Console" panose="020B0609040504020204" pitchFamily="49" charset="0"/>
+              </a:rPr>
+              <a:t>VirtualHost</a:t>
+            </a:r>
+            <a:r>
+              <a:rPr lang="nl-BE" sz="1400" dirty="0">
+                <a:solidFill>
+                  <a:schemeClr val="tx2"/>
+                </a:solidFill>
+                <a:latin typeface="Lucida Console" panose="020B0609040504020204" pitchFamily="49" charset="0"/>
+              </a:rPr>
+              <a:t>&gt;</a:t>
             </a:r>
             <a:r>
               <a:rPr lang="nl-BE" sz="1400" dirty="0">
@@ -8033,11 +8651,7 @@
             <a:pPr algn="r"/>
             <a:r>
               <a:rPr lang="nl-BE" dirty="0" smtClean="0"/>
-              <a:t>Virtual Hosts: </a:t>
-            </a:r>
-            <a:r>
-              <a:rPr lang="nl-BE" dirty="0" smtClean="0"/>
-              <a:t>FAQ</a:t>
+              <a:t>Virtual Hosts: FAQ</a:t>
             </a:r>
             <a:endParaRPr lang="nl-BE" dirty="0"/>
           </a:p>
@@ -8280,11 +8894,7 @@
             <a:pPr algn="r"/>
             <a:r>
               <a:rPr lang="nl-BE" dirty="0" smtClean="0"/>
-              <a:t>Virtual Hosts: </a:t>
-            </a:r>
-            <a:r>
-              <a:rPr lang="nl-BE" dirty="0" smtClean="0"/>
-              <a:t>FAQ</a:t>
+              <a:t>Virtual Hosts: FAQ</a:t>
             </a:r>
             <a:endParaRPr lang="nl-BE" dirty="0"/>
           </a:p>
@@ -8577,11 +9187,7 @@
             <a:pPr algn="r"/>
             <a:r>
               <a:rPr lang="nl-BE" dirty="0" smtClean="0"/>
-              <a:t>Virtual Hosts: </a:t>
-            </a:r>
-            <a:r>
-              <a:rPr lang="nl-BE" dirty="0" smtClean="0"/>
-              <a:t>FAQ</a:t>
+              <a:t>Virtual Hosts: FAQ</a:t>
             </a:r>
             <a:endParaRPr lang="nl-BE" dirty="0"/>
           </a:p>
@@ -8605,7 +9211,7 @@
         </p:spPr>
         <p:txBody>
           <a:bodyPr>
-            <a:normAutofit fontScale="70000" lnSpcReduction="20000"/>
+            <a:normAutofit fontScale="85000" lnSpcReduction="20000"/>
           </a:bodyPr>
           <a:lstStyle/>
           <a:p>
@@ -8626,220 +9232,191 @@
           <a:p>
             <a:pPr lvl="1" fontAlgn="base"/>
             <a:r>
-              <a:rPr lang="nl-NL" dirty="0" smtClean="0"/>
-              <a:t>Je </a:t>
-            </a:r>
-            <a:r>
-              <a:rPr lang="nl-NL" dirty="0"/>
-              <a:t>het niet de juiste permissie om deze mappen of bestanden te bekijken</a:t>
-            </a:r>
-            <a:r>
-              <a:rPr lang="nl-NL" dirty="0" smtClean="0"/>
-              <a:t>.</a:t>
-            </a:r>
-            <a:br>
-              <a:rPr lang="nl-NL" dirty="0" smtClean="0"/>
-            </a:br>
-            <a:endParaRPr lang="nl-NL" dirty="0" smtClean="0"/>
-          </a:p>
-          <a:p>
-            <a:pPr lvl="1" fontAlgn="base"/>
-            <a:r>
-              <a:rPr lang="nl-NL" dirty="0"/>
-              <a:t>Voor Mac moet er een gebruiker ingesteld worden in het </a:t>
-            </a:r>
-            <a:r>
-              <a:rPr lang="nl-NL" dirty="0" err="1"/>
+              <a:rPr lang="nl-BE" dirty="0" smtClean="0"/>
+              <a:t>Het virtual host bestand wordt nog niet ingeladen</a:t>
+            </a:r>
+            <a:br>
+              <a:rPr lang="nl-BE" dirty="0" smtClean="0"/>
+            </a:br>
+            <a:endParaRPr lang="nl-BE" dirty="0" smtClean="0"/>
+          </a:p>
+          <a:p>
+            <a:pPr lvl="2" fontAlgn="base"/>
+            <a:r>
+              <a:rPr lang="nl-BE" sz="2500" dirty="0" smtClean="0"/>
+              <a:t>Ga op zoek naar het </a:t>
+            </a:r>
+            <a:r>
+              <a:rPr lang="nl-BE" sz="2500" dirty="0" err="1" smtClean="0"/>
               <a:t>httpd.conf</a:t>
             </a:r>
             <a:r>
-              <a:rPr lang="nl-NL" dirty="0"/>
-              <a:t>-bestand. Open het </a:t>
-            </a:r>
-            <a:r>
-              <a:rPr lang="nl-NL" dirty="0" err="1"/>
-              <a:t>httpd.conf</a:t>
-            </a:r>
-            <a:r>
-              <a:rPr lang="nl-NL" dirty="0"/>
-              <a:t>-bestand en zoek de volgende </a:t>
-            </a:r>
-            <a:r>
-              <a:rPr lang="nl-NL" dirty="0" err="1"/>
-              <a:t>codeblok</a:t>
-            </a:r>
-            <a:r>
-              <a:rPr lang="nl-NL" dirty="0" smtClean="0"/>
-              <a:t>:</a:t>
-            </a:r>
-            <a:br>
-              <a:rPr lang="nl-NL" dirty="0" smtClean="0"/>
-            </a:br>
-            <a:endParaRPr lang="nl-NL" dirty="0" smtClean="0"/>
+              <a:rPr lang="nl-BE" sz="2500" dirty="0" smtClean="0"/>
+              <a:t> bestand</a:t>
+            </a:r>
+            <a:br>
+              <a:rPr lang="nl-BE" sz="2500" dirty="0" smtClean="0"/>
+            </a:br>
+            <a:endParaRPr lang="nl-BE" sz="2500" dirty="0" smtClean="0"/>
           </a:p>
           <a:p>
             <a:pPr lvl="2" fontAlgn="base"/>
             <a:r>
-              <a:rPr lang="en-US" sz="1700" dirty="0">
-                <a:latin typeface="Lucida Console" panose="020B0609040504020204" pitchFamily="49" charset="0"/>
-              </a:rPr>
-              <a:t># User/Group: The name (or #number) of the user/group to run </a:t>
-            </a:r>
-            <a:r>
-              <a:rPr lang="en-US" sz="1700" dirty="0" err="1">
-                <a:latin typeface="Lucida Console" panose="020B0609040504020204" pitchFamily="49" charset="0"/>
-              </a:rPr>
-              <a:t>httpd</a:t>
-            </a:r>
-            <a:r>
-              <a:rPr lang="en-US" sz="1700" dirty="0">
-                <a:latin typeface="Lucida Console" panose="020B0609040504020204" pitchFamily="49" charset="0"/>
-              </a:rPr>
-              <a:t> as.</a:t>
-            </a:r>
+              <a:rPr lang="nl-NL" sz="2500" dirty="0" smtClean="0"/>
+              <a:t>zoek </a:t>
+            </a:r>
+            <a:r>
+              <a:rPr lang="nl-NL" sz="2500" dirty="0"/>
+              <a:t>naar </a:t>
+            </a:r>
+            <a:r>
+              <a:rPr lang="nl-NL" sz="2500" dirty="0" smtClean="0"/>
+              <a:t>deze lijn</a:t>
+            </a:r>
+            <a:br>
+              <a:rPr lang="nl-NL" sz="2500" dirty="0" smtClean="0"/>
+            </a:br>
+            <a:r>
+              <a:rPr lang="nl-NL" sz="2500" dirty="0" smtClean="0"/>
+              <a:t/>
+            </a:r>
+            <a:br>
+              <a:rPr lang="nl-NL" sz="2500" dirty="0" smtClean="0"/>
+            </a:br>
+            <a:r>
+              <a:rPr lang="nl-NL" sz="2500" dirty="0" smtClean="0"/>
+              <a:t>	</a:t>
+            </a:r>
+            <a:r>
+              <a:rPr lang="nl-NL" sz="1900" dirty="0" smtClean="0">
+                <a:latin typeface="Consolas" panose="020B0609020204030204" pitchFamily="49" charset="0"/>
+                <a:cs typeface="Consolas" panose="020B0609020204030204" pitchFamily="49" charset="0"/>
+              </a:rPr>
+              <a:t>#</a:t>
+            </a:r>
+            <a:r>
+              <a:rPr lang="nl-NL" sz="1900" dirty="0" err="1">
+                <a:latin typeface="Consolas" panose="020B0609020204030204" pitchFamily="49" charset="0"/>
+                <a:cs typeface="Consolas" panose="020B0609020204030204" pitchFamily="49" charset="0"/>
+              </a:rPr>
+              <a:t>Include</a:t>
+            </a:r>
+            <a:r>
+              <a:rPr lang="nl-NL" sz="1900" dirty="0">
+                <a:latin typeface="Consolas" panose="020B0609020204030204" pitchFamily="49" charset="0"/>
+                <a:cs typeface="Consolas" panose="020B0609020204030204" pitchFamily="49" charset="0"/>
+              </a:rPr>
+              <a:t> /</a:t>
+            </a:r>
+            <a:r>
+              <a:rPr lang="nl-NL" sz="1900" dirty="0" smtClean="0">
+                <a:latin typeface="Consolas" panose="020B0609020204030204" pitchFamily="49" charset="0"/>
+                <a:cs typeface="Consolas" panose="020B0609020204030204" pitchFamily="49" charset="0"/>
+              </a:rPr>
+              <a:t>Applications/</a:t>
+            </a:r>
+            <a:r>
+              <a:rPr lang="nl-NL" sz="1900" dirty="0" err="1" smtClean="0">
+                <a:latin typeface="Consolas" panose="020B0609020204030204" pitchFamily="49" charset="0"/>
+                <a:cs typeface="Consolas" panose="020B0609020204030204" pitchFamily="49" charset="0"/>
+              </a:rPr>
+              <a:t>xampp</a:t>
+            </a:r>
+            <a:r>
+              <a:rPr lang="nl-NL" sz="1900" dirty="0" smtClean="0">
+                <a:latin typeface="Consolas" panose="020B0609020204030204" pitchFamily="49" charset="0"/>
+                <a:cs typeface="Consolas" panose="020B0609020204030204" pitchFamily="49" charset="0"/>
+              </a:rPr>
+              <a:t>/</a:t>
+            </a:r>
+            <a:r>
+              <a:rPr lang="nl-NL" sz="1900" dirty="0" err="1" smtClean="0">
+                <a:latin typeface="Consolas" panose="020B0609020204030204" pitchFamily="49" charset="0"/>
+                <a:cs typeface="Consolas" panose="020B0609020204030204" pitchFamily="49" charset="0"/>
+              </a:rPr>
+              <a:t>etc</a:t>
+            </a:r>
+            <a:r>
+              <a:rPr lang="nl-NL" sz="1900" dirty="0" smtClean="0">
+                <a:latin typeface="Consolas" panose="020B0609020204030204" pitchFamily="49" charset="0"/>
+                <a:cs typeface="Consolas" panose="020B0609020204030204" pitchFamily="49" charset="0"/>
+              </a:rPr>
+              <a:t>/extra/</a:t>
+            </a:r>
+            <a:r>
+              <a:rPr lang="nl-NL" sz="1900" dirty="0" err="1" smtClean="0">
+                <a:latin typeface="Consolas" panose="020B0609020204030204" pitchFamily="49" charset="0"/>
+                <a:cs typeface="Consolas" panose="020B0609020204030204" pitchFamily="49" charset="0"/>
+              </a:rPr>
+              <a:t>httpd-vhosts.conf</a:t>
+            </a:r>
+            <a:r>
+              <a:rPr lang="nl-NL" sz="1900" dirty="0" smtClean="0">
+                <a:latin typeface="Consolas" panose="020B0609020204030204" pitchFamily="49" charset="0"/>
+                <a:cs typeface="Consolas" panose="020B0609020204030204" pitchFamily="49" charset="0"/>
+              </a:rPr>
+              <a:t/>
+            </a:r>
+            <a:br>
+              <a:rPr lang="nl-NL" sz="1900" dirty="0" smtClean="0">
+                <a:latin typeface="Consolas" panose="020B0609020204030204" pitchFamily="49" charset="0"/>
+                <a:cs typeface="Consolas" panose="020B0609020204030204" pitchFamily="49" charset="0"/>
+              </a:rPr>
+            </a:br>
+            <a:endParaRPr lang="nl-NL" sz="1900" dirty="0">
+              <a:latin typeface="Consolas" panose="020B0609020204030204" pitchFamily="49" charset="0"/>
+              <a:cs typeface="Consolas" panose="020B0609020204030204" pitchFamily="49" charset="0"/>
+            </a:endParaRPr>
           </a:p>
           <a:p>
             <a:pPr lvl="2" fontAlgn="base"/>
             <a:r>
-              <a:rPr lang="en-US" sz="1700" dirty="0">
-                <a:latin typeface="Lucida Console" panose="020B0609040504020204" pitchFamily="49" charset="0"/>
-              </a:rPr>
-              <a:t># It is usually good practice to create a dedicated user and group for</a:t>
-            </a:r>
+              <a:rPr lang="nl-NL" sz="2500" dirty="0" smtClean="0"/>
+              <a:t>Verwijder </a:t>
+            </a:r>
+            <a:r>
+              <a:rPr lang="nl-NL" sz="2500" dirty="0"/>
+              <a:t>de # voor de </a:t>
+            </a:r>
+            <a:r>
+              <a:rPr lang="nl-NL" sz="2500" dirty="0" err="1" smtClean="0"/>
+              <a:t>Include</a:t>
+            </a:r>
+            <a:r>
+              <a:rPr lang="nl-NL" sz="2500" dirty="0"/>
+              <a:t/>
+            </a:r>
+            <a:br>
+              <a:rPr lang="nl-NL" sz="2500" dirty="0"/>
+            </a:br>
+            <a:endParaRPr lang="nl-NL" sz="2500" dirty="0" smtClean="0"/>
           </a:p>
           <a:p>
             <a:pPr lvl="2" fontAlgn="base"/>
             <a:r>
-              <a:rPr lang="en-US" sz="1700" dirty="0">
-                <a:latin typeface="Lucida Console" panose="020B0609040504020204" pitchFamily="49" charset="0"/>
-              </a:rPr>
-              <a:t># running </a:t>
-            </a:r>
-            <a:r>
-              <a:rPr lang="en-US" sz="1700" dirty="0" err="1">
-                <a:latin typeface="Lucida Console" panose="020B0609040504020204" pitchFamily="49" charset="0"/>
-              </a:rPr>
-              <a:t>httpd</a:t>
-            </a:r>
-            <a:r>
-              <a:rPr lang="en-US" sz="1700" dirty="0">
-                <a:latin typeface="Lucida Console" panose="020B0609040504020204" pitchFamily="49" charset="0"/>
-              </a:rPr>
-              <a:t>, as with most system services.</a:t>
-            </a:r>
+              <a:rPr lang="nl-NL" sz="2500" dirty="0" smtClean="0"/>
+              <a:t>Herstart </a:t>
+            </a:r>
+            <a:r>
+              <a:rPr lang="nl-NL" sz="2500" dirty="0"/>
+              <a:t>XAMPP en probeer </a:t>
+            </a:r>
+            <a:r>
+              <a:rPr lang="nl-NL" sz="2500" dirty="0" smtClean="0"/>
+              <a:t>opnieuw</a:t>
+            </a:r>
+            <a:br>
+              <a:rPr lang="nl-NL" sz="2500" dirty="0" smtClean="0"/>
+            </a:br>
+            <a:endParaRPr lang="nl-NL" sz="2500" dirty="0" smtClean="0"/>
           </a:p>
           <a:p>
             <a:pPr lvl="2" fontAlgn="base"/>
             <a:r>
-              <a:rPr lang="en-US" sz="1700" dirty="0">
-                <a:latin typeface="Lucida Console" panose="020B0609040504020204" pitchFamily="49" charset="0"/>
-              </a:rPr>
-              <a:t>#</a:t>
-            </a:r>
-          </a:p>
-          <a:p>
-            <a:pPr lvl="2" fontAlgn="base"/>
-            <a:r>
-              <a:rPr lang="en-US" sz="1700" dirty="0">
-                <a:latin typeface="Lucida Console" panose="020B0609040504020204" pitchFamily="49" charset="0"/>
-              </a:rPr>
-              <a:t>User daemon</a:t>
-            </a:r>
-          </a:p>
-          <a:p>
-            <a:pPr lvl="2" fontAlgn="base"/>
-            <a:r>
-              <a:rPr lang="en-US" sz="1700" dirty="0">
-                <a:latin typeface="Lucida Console" panose="020B0609040504020204" pitchFamily="49" charset="0"/>
-              </a:rPr>
-              <a:t>Group </a:t>
-            </a:r>
-            <a:r>
-              <a:rPr lang="en-US" sz="1700" dirty="0" smtClean="0">
-                <a:latin typeface="Lucida Console" panose="020B0609040504020204" pitchFamily="49" charset="0"/>
-              </a:rPr>
-              <a:t>daemon</a:t>
-            </a:r>
-            <a:br>
-              <a:rPr lang="en-US" sz="1700" dirty="0" smtClean="0">
-                <a:latin typeface="Lucida Console" panose="020B0609040504020204" pitchFamily="49" charset="0"/>
-              </a:rPr>
-            </a:br>
-            <a:endParaRPr lang="en-US" sz="1700" dirty="0" smtClean="0">
-              <a:latin typeface="Lucida Console" panose="020B0609040504020204" pitchFamily="49" charset="0"/>
-            </a:endParaRPr>
-          </a:p>
-          <a:p>
-            <a:pPr lvl="1" fontAlgn="base"/>
-            <a:r>
-              <a:rPr lang="nl-NL" sz="2900" dirty="0" smtClean="0"/>
-              <a:t>Vervang </a:t>
-            </a:r>
-            <a:r>
-              <a:rPr lang="nl-NL" sz="2900" dirty="0"/>
-              <a:t>bij de </a:t>
-            </a:r>
-            <a:r>
-              <a:rPr lang="nl-NL" sz="2900" b="1" dirty="0" smtClean="0"/>
-              <a:t>User</a:t>
-            </a:r>
-            <a:r>
-              <a:rPr lang="nl-NL" sz="2900" dirty="0" smtClean="0"/>
-              <a:t> </a:t>
-            </a:r>
-            <a:r>
-              <a:rPr lang="nl-NL" sz="2900" dirty="0"/>
-              <a:t>variabele </a:t>
-            </a:r>
-            <a:r>
-              <a:rPr lang="nl-NL" sz="2900" dirty="0" smtClean="0"/>
-              <a:t>de </a:t>
-            </a:r>
-            <a:r>
-              <a:rPr lang="nl-NL" sz="2900" b="1" dirty="0" err="1" smtClean="0"/>
-              <a:t>daemon</a:t>
-            </a:r>
-            <a:r>
-              <a:rPr lang="nl-NL" sz="2900" dirty="0" smtClean="0"/>
-              <a:t> </a:t>
-            </a:r>
-            <a:r>
-              <a:rPr lang="nl-NL" sz="2900" dirty="0"/>
-              <a:t>waarde in je eigen gebruikersnaam. </a:t>
-            </a:r>
-            <a:r>
-              <a:rPr lang="nl-NL" sz="2900" dirty="0"/>
-              <a:t>Deze gebruikersnaam is hoofdlettergevoelig. </a:t>
-            </a:r>
-            <a:r>
-              <a:rPr lang="nl-NL" sz="2900" dirty="0"/>
-              <a:t>De </a:t>
-            </a:r>
-            <a:r>
-              <a:rPr lang="nl-NL" sz="2900" b="1" dirty="0" smtClean="0"/>
-              <a:t>Group</a:t>
-            </a:r>
-            <a:r>
-              <a:rPr lang="nl-NL" sz="2900" dirty="0" smtClean="0"/>
-              <a:t> </a:t>
-            </a:r>
-            <a:r>
-              <a:rPr lang="nl-NL" sz="2900" dirty="0"/>
-              <a:t>waarde mag onveranderd blijven. </a:t>
-            </a:r>
-            <a:r>
-              <a:rPr lang="nl-NL" sz="2900" dirty="0"/>
-              <a:t>Vergeet na het aanpassen niet je Apache server te </a:t>
-            </a:r>
-            <a:r>
-              <a:rPr lang="nl-NL" sz="2900" dirty="0" err="1"/>
-              <a:t>herstarten</a:t>
-            </a:r>
-            <a:r>
-              <a:rPr lang="nl-NL" sz="2900" dirty="0"/>
-              <a:t>.</a:t>
-            </a:r>
-            <a:endParaRPr lang="en-US" sz="2900" dirty="0"/>
+              <a:rPr lang="nl-NL" sz="2500" dirty="0" smtClean="0"/>
+              <a:t>Werkt nog steeds niet? Zie volgende stap</a:t>
+            </a:r>
+            <a:endParaRPr lang="en-US" sz="2500" dirty="0"/>
           </a:p>
           <a:p>
             <a:pPr lvl="2" fontAlgn="base"/>
@@ -8858,7 +9435,7 @@
     </p:spTree>
     <p:extLst>
       <p:ext uri="{BB962C8B-B14F-4D97-AF65-F5344CB8AC3E}">
-        <p14:creationId xmlns:p14="http://schemas.microsoft.com/office/powerpoint/2010/main" val="553064439"/>
+        <p14:creationId xmlns:p14="http://schemas.microsoft.com/office/powerpoint/2010/main" val="2198989460"/>
       </p:ext>
     </p:extLst>
   </p:cSld>
@@ -8903,11 +9480,340 @@
             <a:pPr algn="r"/>
             <a:r>
               <a:rPr lang="nl-BE" dirty="0" smtClean="0"/>
-              <a:t>Virtual Hosts: </a:t>
-            </a:r>
-            <a:r>
-              <a:rPr lang="nl-BE" dirty="0" smtClean="0"/>
-              <a:t>FAQ</a:t>
+              <a:t>Virtual Hosts: FAQ</a:t>
+            </a:r>
+            <a:endParaRPr lang="nl-BE" dirty="0"/>
+          </a:p>
+        </p:txBody>
+      </p:sp>
+      <p:sp>
+        <p:nvSpPr>
+          <p:cNvPr id="3" name="Content Placeholder 2"/>
+          <p:cNvSpPr>
+            <a:spLocks noGrp="1"/>
+          </p:cNvSpPr>
+          <p:nvPr>
+            <p:ph idx="1"/>
+          </p:nvPr>
+        </p:nvSpPr>
+        <p:spPr>
+          <a:xfrm>
+            <a:off x="457200" y="1600200"/>
+            <a:ext cx="8795320" cy="4525963"/>
+          </a:xfrm>
+        </p:spPr>
+        <p:txBody>
+          <a:bodyPr>
+            <a:normAutofit fontScale="62500" lnSpcReduction="20000"/>
+          </a:bodyPr>
+          <a:lstStyle/>
+          <a:p>
+            <a:pPr fontAlgn="base"/>
+            <a:r>
+              <a:rPr lang="nl-NL" dirty="0"/>
+              <a:t>Ik krijg een </a:t>
+            </a:r>
+            <a:r>
+              <a:rPr lang="nl-NL" dirty="0" smtClean="0"/>
+              <a:t>403-error.</a:t>
+            </a:r>
+            <a:br>
+              <a:rPr lang="nl-NL" dirty="0" smtClean="0"/>
+            </a:br>
+            <a:endParaRPr lang="nl-NL" dirty="0" smtClean="0"/>
+          </a:p>
+          <a:p>
+            <a:pPr lvl="1" fontAlgn="base"/>
+            <a:r>
+              <a:rPr lang="nl-NL" dirty="0" smtClean="0"/>
+              <a:t>Je </a:t>
+            </a:r>
+            <a:r>
+              <a:rPr lang="nl-NL" dirty="0"/>
+              <a:t>het niet de juiste permissie om deze mappen of bestanden te bekijken</a:t>
+            </a:r>
+            <a:r>
+              <a:rPr lang="nl-NL" dirty="0" smtClean="0"/>
+              <a:t>.</a:t>
+            </a:r>
+            <a:br>
+              <a:rPr lang="nl-NL" dirty="0" smtClean="0"/>
+            </a:br>
+            <a:endParaRPr lang="nl-NL" dirty="0" smtClean="0"/>
+          </a:p>
+          <a:p>
+            <a:pPr lvl="1" fontAlgn="base"/>
+            <a:r>
+              <a:rPr lang="nl-NL" dirty="0"/>
+              <a:t>Voor Mac moet er een gebruiker ingesteld worden in het </a:t>
+            </a:r>
+            <a:r>
+              <a:rPr lang="nl-NL" dirty="0" err="1"/>
+              <a:t>httpd.conf</a:t>
+            </a:r>
+            <a:r>
+              <a:rPr lang="nl-NL" dirty="0"/>
+              <a:t>-bestand. Open het </a:t>
+            </a:r>
+            <a:r>
+              <a:rPr lang="nl-NL" dirty="0" err="1"/>
+              <a:t>httpd.conf</a:t>
+            </a:r>
+            <a:r>
+              <a:rPr lang="nl-NL" dirty="0"/>
+              <a:t>-bestand en zoek de volgende </a:t>
+            </a:r>
+            <a:r>
+              <a:rPr lang="nl-NL" dirty="0" err="1"/>
+              <a:t>codeblok</a:t>
+            </a:r>
+            <a:r>
+              <a:rPr lang="nl-NL" dirty="0" smtClean="0"/>
+              <a:t>:</a:t>
+            </a:r>
+            <a:br>
+              <a:rPr lang="nl-NL" dirty="0" smtClean="0"/>
+            </a:br>
+            <a:endParaRPr lang="nl-NL" dirty="0" smtClean="0"/>
+          </a:p>
+          <a:p>
+            <a:pPr lvl="2" fontAlgn="base"/>
+            <a:r>
+              <a:rPr lang="en-US" sz="1700" dirty="0">
+                <a:latin typeface="Lucida Console" panose="020B0609040504020204" pitchFamily="49" charset="0"/>
+              </a:rPr>
+              <a:t># User/Group: The name (or #number) of the user/group to run </a:t>
+            </a:r>
+            <a:r>
+              <a:rPr lang="en-US" sz="1700" dirty="0" err="1">
+                <a:latin typeface="Lucida Console" panose="020B0609040504020204" pitchFamily="49" charset="0"/>
+              </a:rPr>
+              <a:t>httpd</a:t>
+            </a:r>
+            <a:r>
+              <a:rPr lang="en-US" sz="1700" dirty="0">
+                <a:latin typeface="Lucida Console" panose="020B0609040504020204" pitchFamily="49" charset="0"/>
+              </a:rPr>
+              <a:t> as.</a:t>
+            </a:r>
+          </a:p>
+          <a:p>
+            <a:pPr lvl="2" fontAlgn="base"/>
+            <a:r>
+              <a:rPr lang="en-US" sz="1700" dirty="0">
+                <a:latin typeface="Lucida Console" panose="020B0609040504020204" pitchFamily="49" charset="0"/>
+              </a:rPr>
+              <a:t># It is usually good practice to create a dedicated user and group for</a:t>
+            </a:r>
+          </a:p>
+          <a:p>
+            <a:pPr lvl="2" fontAlgn="base"/>
+            <a:r>
+              <a:rPr lang="en-US" sz="1700" dirty="0">
+                <a:latin typeface="Lucida Console" panose="020B0609040504020204" pitchFamily="49" charset="0"/>
+              </a:rPr>
+              <a:t># running </a:t>
+            </a:r>
+            <a:r>
+              <a:rPr lang="en-US" sz="1700" dirty="0" err="1">
+                <a:latin typeface="Lucida Console" panose="020B0609040504020204" pitchFamily="49" charset="0"/>
+              </a:rPr>
+              <a:t>httpd</a:t>
+            </a:r>
+            <a:r>
+              <a:rPr lang="en-US" sz="1700" dirty="0">
+                <a:latin typeface="Lucida Console" panose="020B0609040504020204" pitchFamily="49" charset="0"/>
+              </a:rPr>
+              <a:t>, as with most system services.</a:t>
+            </a:r>
+          </a:p>
+          <a:p>
+            <a:pPr lvl="2" fontAlgn="base"/>
+            <a:r>
+              <a:rPr lang="en-US" sz="1700" dirty="0">
+                <a:latin typeface="Lucida Console" panose="020B0609040504020204" pitchFamily="49" charset="0"/>
+              </a:rPr>
+              <a:t>#</a:t>
+            </a:r>
+          </a:p>
+          <a:p>
+            <a:pPr lvl="2" fontAlgn="base"/>
+            <a:r>
+              <a:rPr lang="en-US" sz="1700" dirty="0">
+                <a:latin typeface="Lucida Console" panose="020B0609040504020204" pitchFamily="49" charset="0"/>
+              </a:rPr>
+              <a:t>User daemon</a:t>
+            </a:r>
+          </a:p>
+          <a:p>
+            <a:pPr lvl="2" fontAlgn="base"/>
+            <a:r>
+              <a:rPr lang="en-US" sz="1700" dirty="0">
+                <a:latin typeface="Lucida Console" panose="020B0609040504020204" pitchFamily="49" charset="0"/>
+              </a:rPr>
+              <a:t>Group </a:t>
+            </a:r>
+            <a:r>
+              <a:rPr lang="en-US" sz="1700" dirty="0" smtClean="0">
+                <a:latin typeface="Lucida Console" panose="020B0609040504020204" pitchFamily="49" charset="0"/>
+              </a:rPr>
+              <a:t>daemon</a:t>
+            </a:r>
+            <a:br>
+              <a:rPr lang="en-US" sz="1700" dirty="0" smtClean="0">
+                <a:latin typeface="Lucida Console" panose="020B0609040504020204" pitchFamily="49" charset="0"/>
+              </a:rPr>
+            </a:br>
+            <a:endParaRPr lang="en-US" sz="1700" dirty="0" smtClean="0">
+              <a:latin typeface="Lucida Console" panose="020B0609040504020204" pitchFamily="49" charset="0"/>
+            </a:endParaRPr>
+          </a:p>
+          <a:p>
+            <a:pPr lvl="1" fontAlgn="base"/>
+            <a:r>
+              <a:rPr lang="nl-NL" sz="2900" dirty="0" smtClean="0"/>
+              <a:t>Vervang </a:t>
+            </a:r>
+            <a:r>
+              <a:rPr lang="nl-NL" sz="2900" dirty="0"/>
+              <a:t>bij de </a:t>
+            </a:r>
+            <a:r>
+              <a:rPr lang="nl-NL" sz="2900" b="1" dirty="0" smtClean="0"/>
+              <a:t>User</a:t>
+            </a:r>
+            <a:r>
+              <a:rPr lang="nl-NL" sz="2900" dirty="0" smtClean="0"/>
+              <a:t> </a:t>
+            </a:r>
+            <a:r>
+              <a:rPr lang="nl-NL" sz="2900" dirty="0"/>
+              <a:t>variabele </a:t>
+            </a:r>
+            <a:r>
+              <a:rPr lang="nl-NL" sz="2900" dirty="0" smtClean="0"/>
+              <a:t>de </a:t>
+            </a:r>
+            <a:r>
+              <a:rPr lang="nl-NL" sz="2900" b="1" dirty="0" err="1" smtClean="0"/>
+              <a:t>daemon</a:t>
+            </a:r>
+            <a:r>
+              <a:rPr lang="nl-NL" sz="2900" dirty="0" smtClean="0"/>
+              <a:t> </a:t>
+            </a:r>
+            <a:r>
+              <a:rPr lang="nl-NL" sz="2900" dirty="0"/>
+              <a:t>waarde in je eigen gebruikersnaam. Deze gebruikersnaam is hoofdlettergevoelig. De </a:t>
+            </a:r>
+            <a:r>
+              <a:rPr lang="nl-NL" sz="2900" b="1" dirty="0" smtClean="0"/>
+              <a:t>Group</a:t>
+            </a:r>
+            <a:r>
+              <a:rPr lang="nl-NL" sz="2900" dirty="0" smtClean="0"/>
+              <a:t> </a:t>
+            </a:r>
+            <a:r>
+              <a:rPr lang="nl-NL" sz="2900" dirty="0"/>
+              <a:t>waarde mag onveranderd blijven. Vergeet na het aanpassen niet je Apache server te herstarten</a:t>
+            </a:r>
+            <a:r>
+              <a:rPr lang="nl-NL" sz="2900" dirty="0" smtClean="0"/>
+              <a:t>.</a:t>
+            </a:r>
+            <a:br>
+              <a:rPr lang="nl-NL" sz="2900" dirty="0" smtClean="0"/>
+            </a:br>
+            <a:endParaRPr lang="nl-NL" sz="2900" dirty="0" smtClean="0"/>
+          </a:p>
+          <a:p>
+            <a:pPr lvl="1" fontAlgn="base"/>
+            <a:r>
+              <a:rPr lang="nl-NL" sz="2900" dirty="0"/>
+              <a:t>URL: </a:t>
+            </a:r>
+            <a:r>
+              <a:rPr lang="nl-NL" sz="2900" dirty="0">
+                <a:hlinkClick r:id="rId2"/>
+              </a:rPr>
+              <a:t>http://jonathannicol.com/blog/2012/03/11/configuring-virtualhosts-in-xampp-on-mac</a:t>
+            </a:r>
+            <a:r>
+              <a:rPr lang="nl-NL" sz="2900" dirty="0" smtClean="0">
+                <a:hlinkClick r:id="rId2"/>
+              </a:rPr>
+              <a:t>/</a:t>
+            </a:r>
+            <a:r>
+              <a:rPr lang="nl-NL" sz="2900" dirty="0" smtClean="0"/>
+              <a:t> </a:t>
+            </a:r>
+            <a:endParaRPr lang="en-US" sz="2900" dirty="0"/>
+          </a:p>
+          <a:p>
+            <a:pPr lvl="2" fontAlgn="base"/>
+            <a:endParaRPr lang="en-US" dirty="0"/>
+          </a:p>
+          <a:p>
+            <a:pPr lvl="1" fontAlgn="base"/>
+            <a:endParaRPr lang="en-US" dirty="0"/>
+          </a:p>
+          <a:p>
+            <a:pPr lvl="1" fontAlgn="base"/>
+            <a:endParaRPr lang="nl-NL" dirty="0" smtClean="0"/>
+          </a:p>
+        </p:txBody>
+      </p:sp>
+    </p:spTree>
+    <p:extLst>
+      <p:ext uri="{BB962C8B-B14F-4D97-AF65-F5344CB8AC3E}">
+        <p14:creationId xmlns:p14="http://schemas.microsoft.com/office/powerpoint/2010/main" val="553064439"/>
+      </p:ext>
+    </p:extLst>
+  </p:cSld>
+  <p:clrMapOvr>
+    <a:masterClrMapping/>
+  </p:clrMapOvr>
+</p:sld>
+</file>
+
+<file path=ppt/slides/slide35.xml><?xml version="1.0" encoding="utf-8"?>
+<p:sld xmlns:a="http://schemas.openxmlformats.org/drawingml/2006/main" xmlns:r="http://schemas.openxmlformats.org/officeDocument/2006/relationships" xmlns:p="http://schemas.openxmlformats.org/presentationml/2006/main">
+  <p:cSld>
+    <p:spTree>
+      <p:nvGrpSpPr>
+        <p:cNvPr id="1" name=""/>
+        <p:cNvGrpSpPr/>
+        <p:nvPr/>
+      </p:nvGrpSpPr>
+      <p:grpSpPr>
+        <a:xfrm>
+          <a:off x="0" y="0"/>
+          <a:ext cx="0" cy="0"/>
+          <a:chOff x="0" y="0"/>
+          <a:chExt cx="0" cy="0"/>
+        </a:xfrm>
+      </p:grpSpPr>
+      <p:sp>
+        <p:nvSpPr>
+          <p:cNvPr id="2" name="Title 1"/>
+          <p:cNvSpPr>
+            <a:spLocks noGrp="1"/>
+          </p:cNvSpPr>
+          <p:nvPr>
+            <p:ph type="title"/>
+          </p:nvPr>
+        </p:nvSpPr>
+        <p:spPr/>
+        <p:txBody>
+          <a:bodyPr/>
+          <a:lstStyle/>
+          <a:p>
+            <a:pPr algn="r"/>
+            <a:r>
+              <a:rPr lang="nl-BE" dirty="0" smtClean="0"/>
+              <a:t>Virtual Hosts: FAQ</a:t>
             </a:r>
             <a:endParaRPr lang="nl-BE" dirty="0"/>
           </a:p>

</xml_diff>